<commit_message>
ModelDiagram: Fix on typo
</commit_message>
<xml_diff>
--- a/docs/diagrams/ModelComponentClassDiagram.pptx
+++ b/docs/diagrams/ModelComponentClassDiagram.pptx
@@ -8864,7 +8864,7 @@
         </p:nvSpPr>
         <p:spPr>
           <a:xfrm>
-            <a:off x="3945312" y="3206722"/>
+            <a:off x="3945312" y="3221562"/>
             <a:ext cx="708186" cy="346760"/>
           </a:xfrm>
           <a:prstGeom prst="rect">
@@ -8909,57 +8909,6 @@
                 <a:srgbClr val="7030A0"/>
               </a:solidFill>
             </a:endParaRPr>
-          </a:p>
-        </p:txBody>
-      </p:sp>
-      <p:sp>
-        <p:nvSpPr>
-          <p:cNvPr id="168" name="Flowchart: Decision 96">
-            <a:extLst>
-              <a:ext uri="{FF2B5EF4-FFF2-40B4-BE49-F238E27FC236}">
-                <a16:creationId xmlns:a16="http://schemas.microsoft.com/office/drawing/2014/main" id="{DF83A3D5-AD95-094E-AC36-11A1DB01FE16}"/>
-              </a:ext>
-            </a:extLst>
-          </p:cNvPr>
-          <p:cNvSpPr/>
-          <p:nvPr/>
-        </p:nvSpPr>
-        <p:spPr>
-          <a:xfrm>
-            <a:off x="3212825" y="3297642"/>
-            <a:ext cx="236048" cy="173380"/>
-          </a:xfrm>
-          <a:prstGeom prst="flowChartDecision">
-            <a:avLst/>
-          </a:prstGeom>
-          <a:noFill/>
-          <a:ln w="19050">
-            <a:solidFill>
-              <a:srgbClr val="7030A0"/>
-            </a:solidFill>
-          </a:ln>
-          <a:effectLst/>
-        </p:spPr>
-        <p:style>
-          <a:lnRef idx="1">
-            <a:schemeClr val="accent6"/>
-          </a:lnRef>
-          <a:fillRef idx="2">
-            <a:schemeClr val="accent6"/>
-          </a:fillRef>
-          <a:effectRef idx="1">
-            <a:schemeClr val="accent6"/>
-          </a:effectRef>
-          <a:fontRef idx="minor">
-            <a:schemeClr val="dk1"/>
-          </a:fontRef>
-        </p:style>
-        <p:txBody>
-          <a:bodyPr rtlCol="0" anchor="ctr"/>
-          <a:lstStyle/>
-          <a:p>
-            <a:pPr algn="ctr"/>
-            <a:endParaRPr lang="en-US" sz="1050"/>
           </a:p>
         </p:txBody>
       </p:sp>
@@ -8973,15 +8922,16 @@
             </a:extLst>
           </p:cNvPr>
           <p:cNvCxnSpPr>
-            <a:stCxn id="168" idx="3"/>
+            <a:cxnSpLocks/>
+            <a:stCxn id="132" idx="3"/>
             <a:endCxn id="167" idx="1"/>
           </p:cNvCxnSpPr>
           <p:nvPr/>
         </p:nvCxnSpPr>
         <p:spPr>
           <a:xfrm flipV="1">
-            <a:off x="3448874" y="3380103"/>
-            <a:ext cx="496439" cy="4230"/>
+            <a:off x="3458953" y="3394942"/>
+            <a:ext cx="486359" cy="4849"/>
           </a:xfrm>
           <a:prstGeom prst="straightConnector1">
             <a:avLst/>
@@ -9129,7 +9079,7 @@
           </a:xfrm>
           <a:prstGeom prst="bentConnector3">
             <a:avLst>
-              <a:gd name="adj1" fmla="val 111374"/>
+              <a:gd name="adj1" fmla="val 119336"/>
             </a:avLst>
           </a:prstGeom>
           <a:ln w="19050">
@@ -9835,7 +9785,7 @@
                   <a:srgbClr val="7030A0"/>
                 </a:solidFill>
               </a:rPr>
-              <a:t>StaffList</a:t>
+              <a:t>SaleList</a:t>
             </a:r>
             <a:endParaRPr lang="en-SG" sz="1050" dirty="0">
               <a:solidFill>
@@ -9947,6 +9897,59 @@
                 <a:srgbClr val="92D050"/>
               </a:solidFill>
             </a:endParaRPr>
+          </a:p>
+        </p:txBody>
+      </p:sp>
+      <p:sp>
+        <p:nvSpPr>
+          <p:cNvPr id="132" name="Flowchart: Decision 96">
+            <a:extLst>
+              <a:ext uri="{FF2B5EF4-FFF2-40B4-BE49-F238E27FC236}">
+                <a16:creationId xmlns:a16="http://schemas.microsoft.com/office/drawing/2014/main" id="{A29B4DDA-92EC-AB45-B9C3-C09EE02A542D}"/>
+              </a:ext>
+            </a:extLst>
+          </p:cNvPr>
+          <p:cNvSpPr/>
+          <p:nvPr/>
+        </p:nvSpPr>
+        <p:spPr>
+          <a:xfrm>
+            <a:off x="3222905" y="3313101"/>
+            <a:ext cx="236048" cy="173380"/>
+          </a:xfrm>
+          <a:prstGeom prst="flowChartDecision">
+            <a:avLst/>
+          </a:prstGeom>
+          <a:solidFill>
+            <a:srgbClr val="7030A0"/>
+          </a:solidFill>
+          <a:ln w="19050">
+            <a:solidFill>
+              <a:srgbClr val="7030A0"/>
+            </a:solidFill>
+          </a:ln>
+          <a:effectLst/>
+        </p:spPr>
+        <p:style>
+          <a:lnRef idx="1">
+            <a:schemeClr val="accent6"/>
+          </a:lnRef>
+          <a:fillRef idx="2">
+            <a:schemeClr val="accent6"/>
+          </a:fillRef>
+          <a:effectRef idx="1">
+            <a:schemeClr val="accent6"/>
+          </a:effectRef>
+          <a:fontRef idx="minor">
+            <a:schemeClr val="dk1"/>
+          </a:fontRef>
+        </p:style>
+        <p:txBody>
+          <a:bodyPr rtlCol="0" anchor="ctr"/>
+          <a:lstStyle/>
+          <a:p>
+            <a:pPr algn="ctr"/>
+            <a:endParaRPr lang="en-US" sz="1050"/>
           </a:p>
         </p:txBody>
       </p:sp>

</xml_diff>